<commit_message>
update star schema and architecture schema
</commit_message>
<xml_diff>
--- a/df-model/Architecture/archi.pptx
+++ b/df-model/Architecture/archi.pptx
@@ -238,7 +238,8 @@
           <a:p>
             <a:fld id="{951F5236-C321-4571-BD42-D2DAC191E61F}" type="datetimeFigureOut">
               <a:rPr lang="fr-FR" smtClean="0"/>
-              <a:t>21/11/2017</a:t>
+              <a:pPr/>
+              <a:t>15/12/2017</a:t>
             </a:fld>
             <a:endParaRPr lang="fr-FR"/>
           </a:p>
@@ -280,6 +281,7 @@
           <a:p>
             <a:fld id="{C31CB606-8B31-418C-870D-584FB83B743D}" type="slidenum">
               <a:rPr lang="fr-FR" smtClean="0"/>
+              <a:pPr/>
               <a:t>‹N°›</a:t>
             </a:fld>
             <a:endParaRPr lang="fr-FR"/>
@@ -289,7 +291,7 @@
     </p:spTree>
     <p:extLst>
       <p:ext uri="{BB962C8B-B14F-4D97-AF65-F5344CB8AC3E}">
-        <p14:creationId xmlns:p14="http://schemas.microsoft.com/office/powerpoint/2010/main" val="2905014069"/>
+        <p14:creationId xmlns:p14="http://schemas.microsoft.com/office/powerpoint/2010/main" xmlns="" val="2905014069"/>
       </p:ext>
     </p:extLst>
   </p:cSld>
@@ -408,7 +410,8 @@
           <a:p>
             <a:fld id="{951F5236-C321-4571-BD42-D2DAC191E61F}" type="datetimeFigureOut">
               <a:rPr lang="fr-FR" smtClean="0"/>
-              <a:t>21/11/2017</a:t>
+              <a:pPr/>
+              <a:t>15/12/2017</a:t>
             </a:fld>
             <a:endParaRPr lang="fr-FR"/>
           </a:p>
@@ -450,6 +453,7 @@
           <a:p>
             <a:fld id="{C31CB606-8B31-418C-870D-584FB83B743D}" type="slidenum">
               <a:rPr lang="fr-FR" smtClean="0"/>
+              <a:pPr/>
               <a:t>‹N°›</a:t>
             </a:fld>
             <a:endParaRPr lang="fr-FR"/>
@@ -459,7 +463,7 @@
     </p:spTree>
     <p:extLst>
       <p:ext uri="{BB962C8B-B14F-4D97-AF65-F5344CB8AC3E}">
-        <p14:creationId xmlns:p14="http://schemas.microsoft.com/office/powerpoint/2010/main" val="2224154507"/>
+        <p14:creationId xmlns:p14="http://schemas.microsoft.com/office/powerpoint/2010/main" xmlns="" val="2224154507"/>
       </p:ext>
     </p:extLst>
   </p:cSld>
@@ -588,7 +592,8 @@
           <a:p>
             <a:fld id="{951F5236-C321-4571-BD42-D2DAC191E61F}" type="datetimeFigureOut">
               <a:rPr lang="fr-FR" smtClean="0"/>
-              <a:t>21/11/2017</a:t>
+              <a:pPr/>
+              <a:t>15/12/2017</a:t>
             </a:fld>
             <a:endParaRPr lang="fr-FR"/>
           </a:p>
@@ -630,6 +635,7 @@
           <a:p>
             <a:fld id="{C31CB606-8B31-418C-870D-584FB83B743D}" type="slidenum">
               <a:rPr lang="fr-FR" smtClean="0"/>
+              <a:pPr/>
               <a:t>‹N°›</a:t>
             </a:fld>
             <a:endParaRPr lang="fr-FR"/>
@@ -639,7 +645,7 @@
     </p:spTree>
     <p:extLst>
       <p:ext uri="{BB962C8B-B14F-4D97-AF65-F5344CB8AC3E}">
-        <p14:creationId xmlns:p14="http://schemas.microsoft.com/office/powerpoint/2010/main" val="972300784"/>
+        <p14:creationId xmlns:p14="http://schemas.microsoft.com/office/powerpoint/2010/main" xmlns="" val="972300784"/>
       </p:ext>
     </p:extLst>
   </p:cSld>
@@ -758,7 +764,8 @@
           <a:p>
             <a:fld id="{951F5236-C321-4571-BD42-D2DAC191E61F}" type="datetimeFigureOut">
               <a:rPr lang="fr-FR" smtClean="0"/>
-              <a:t>21/11/2017</a:t>
+              <a:pPr/>
+              <a:t>15/12/2017</a:t>
             </a:fld>
             <a:endParaRPr lang="fr-FR"/>
           </a:p>
@@ -800,6 +807,7 @@
           <a:p>
             <a:fld id="{C31CB606-8B31-418C-870D-584FB83B743D}" type="slidenum">
               <a:rPr lang="fr-FR" smtClean="0"/>
+              <a:pPr/>
               <a:t>‹N°›</a:t>
             </a:fld>
             <a:endParaRPr lang="fr-FR"/>
@@ -809,7 +817,7 @@
     </p:spTree>
     <p:extLst>
       <p:ext uri="{BB962C8B-B14F-4D97-AF65-F5344CB8AC3E}">
-        <p14:creationId xmlns:p14="http://schemas.microsoft.com/office/powerpoint/2010/main" val="3849632169"/>
+        <p14:creationId xmlns:p14="http://schemas.microsoft.com/office/powerpoint/2010/main" xmlns="" val="3849632169"/>
       </p:ext>
     </p:extLst>
   </p:cSld>
@@ -1004,7 +1012,8 @@
           <a:p>
             <a:fld id="{951F5236-C321-4571-BD42-D2DAC191E61F}" type="datetimeFigureOut">
               <a:rPr lang="fr-FR" smtClean="0"/>
-              <a:t>21/11/2017</a:t>
+              <a:pPr/>
+              <a:t>15/12/2017</a:t>
             </a:fld>
             <a:endParaRPr lang="fr-FR"/>
           </a:p>
@@ -1046,6 +1055,7 @@
           <a:p>
             <a:fld id="{C31CB606-8B31-418C-870D-584FB83B743D}" type="slidenum">
               <a:rPr lang="fr-FR" smtClean="0"/>
+              <a:pPr/>
               <a:t>‹N°›</a:t>
             </a:fld>
             <a:endParaRPr lang="fr-FR"/>
@@ -1055,7 +1065,7 @@
     </p:spTree>
     <p:extLst>
       <p:ext uri="{BB962C8B-B14F-4D97-AF65-F5344CB8AC3E}">
-        <p14:creationId xmlns:p14="http://schemas.microsoft.com/office/powerpoint/2010/main" val="2013577856"/>
+        <p14:creationId xmlns:p14="http://schemas.microsoft.com/office/powerpoint/2010/main" xmlns="" val="2013577856"/>
       </p:ext>
     </p:extLst>
   </p:cSld>
@@ -1236,7 +1246,8 @@
           <a:p>
             <a:fld id="{951F5236-C321-4571-BD42-D2DAC191E61F}" type="datetimeFigureOut">
               <a:rPr lang="fr-FR" smtClean="0"/>
-              <a:t>21/11/2017</a:t>
+              <a:pPr/>
+              <a:t>15/12/2017</a:t>
             </a:fld>
             <a:endParaRPr lang="fr-FR"/>
           </a:p>
@@ -1278,6 +1289,7 @@
           <a:p>
             <a:fld id="{C31CB606-8B31-418C-870D-584FB83B743D}" type="slidenum">
               <a:rPr lang="fr-FR" smtClean="0"/>
+              <a:pPr/>
               <a:t>‹N°›</a:t>
             </a:fld>
             <a:endParaRPr lang="fr-FR"/>
@@ -1287,7 +1299,7 @@
     </p:spTree>
     <p:extLst>
       <p:ext uri="{BB962C8B-B14F-4D97-AF65-F5344CB8AC3E}">
-        <p14:creationId xmlns:p14="http://schemas.microsoft.com/office/powerpoint/2010/main" val="760579598"/>
+        <p14:creationId xmlns:p14="http://schemas.microsoft.com/office/powerpoint/2010/main" xmlns="" val="760579598"/>
       </p:ext>
     </p:extLst>
   </p:cSld>
@@ -1603,7 +1615,8 @@
           <a:p>
             <a:fld id="{951F5236-C321-4571-BD42-D2DAC191E61F}" type="datetimeFigureOut">
               <a:rPr lang="fr-FR" smtClean="0"/>
-              <a:t>21/11/2017</a:t>
+              <a:pPr/>
+              <a:t>15/12/2017</a:t>
             </a:fld>
             <a:endParaRPr lang="fr-FR"/>
           </a:p>
@@ -1645,6 +1658,7 @@
           <a:p>
             <a:fld id="{C31CB606-8B31-418C-870D-584FB83B743D}" type="slidenum">
               <a:rPr lang="fr-FR" smtClean="0"/>
+              <a:pPr/>
               <a:t>‹N°›</a:t>
             </a:fld>
             <a:endParaRPr lang="fr-FR"/>
@@ -1654,7 +1668,7 @@
     </p:spTree>
     <p:extLst>
       <p:ext uri="{BB962C8B-B14F-4D97-AF65-F5344CB8AC3E}">
-        <p14:creationId xmlns:p14="http://schemas.microsoft.com/office/powerpoint/2010/main" val="2231826537"/>
+        <p14:creationId xmlns:p14="http://schemas.microsoft.com/office/powerpoint/2010/main" xmlns="" val="2231826537"/>
       </p:ext>
     </p:extLst>
   </p:cSld>
@@ -1721,7 +1735,8 @@
           <a:p>
             <a:fld id="{951F5236-C321-4571-BD42-D2DAC191E61F}" type="datetimeFigureOut">
               <a:rPr lang="fr-FR" smtClean="0"/>
-              <a:t>21/11/2017</a:t>
+              <a:pPr/>
+              <a:t>15/12/2017</a:t>
             </a:fld>
             <a:endParaRPr lang="fr-FR"/>
           </a:p>
@@ -1763,6 +1778,7 @@
           <a:p>
             <a:fld id="{C31CB606-8B31-418C-870D-584FB83B743D}" type="slidenum">
               <a:rPr lang="fr-FR" smtClean="0"/>
+              <a:pPr/>
               <a:t>‹N°›</a:t>
             </a:fld>
             <a:endParaRPr lang="fr-FR"/>
@@ -1772,7 +1788,7 @@
     </p:spTree>
     <p:extLst>
       <p:ext uri="{BB962C8B-B14F-4D97-AF65-F5344CB8AC3E}">
-        <p14:creationId xmlns:p14="http://schemas.microsoft.com/office/powerpoint/2010/main" val="4029168585"/>
+        <p14:creationId xmlns:p14="http://schemas.microsoft.com/office/powerpoint/2010/main" xmlns="" val="4029168585"/>
       </p:ext>
     </p:extLst>
   </p:cSld>
@@ -1816,7 +1832,8 @@
           <a:p>
             <a:fld id="{951F5236-C321-4571-BD42-D2DAC191E61F}" type="datetimeFigureOut">
               <a:rPr lang="fr-FR" smtClean="0"/>
-              <a:t>21/11/2017</a:t>
+              <a:pPr/>
+              <a:t>15/12/2017</a:t>
             </a:fld>
             <a:endParaRPr lang="fr-FR"/>
           </a:p>
@@ -1858,6 +1875,7 @@
           <a:p>
             <a:fld id="{C31CB606-8B31-418C-870D-584FB83B743D}" type="slidenum">
               <a:rPr lang="fr-FR" smtClean="0"/>
+              <a:pPr/>
               <a:t>‹N°›</a:t>
             </a:fld>
             <a:endParaRPr lang="fr-FR"/>
@@ -1867,7 +1885,7 @@
     </p:spTree>
     <p:extLst>
       <p:ext uri="{BB962C8B-B14F-4D97-AF65-F5344CB8AC3E}">
-        <p14:creationId xmlns:p14="http://schemas.microsoft.com/office/powerpoint/2010/main" val="2483292293"/>
+        <p14:creationId xmlns:p14="http://schemas.microsoft.com/office/powerpoint/2010/main" xmlns="" val="2483292293"/>
       </p:ext>
     </p:extLst>
   </p:cSld>
@@ -2093,7 +2111,8 @@
           <a:p>
             <a:fld id="{951F5236-C321-4571-BD42-D2DAC191E61F}" type="datetimeFigureOut">
               <a:rPr lang="fr-FR" smtClean="0"/>
-              <a:t>21/11/2017</a:t>
+              <a:pPr/>
+              <a:t>15/12/2017</a:t>
             </a:fld>
             <a:endParaRPr lang="fr-FR"/>
           </a:p>
@@ -2135,6 +2154,7 @@
           <a:p>
             <a:fld id="{C31CB606-8B31-418C-870D-584FB83B743D}" type="slidenum">
               <a:rPr lang="fr-FR" smtClean="0"/>
+              <a:pPr/>
               <a:t>‹N°›</a:t>
             </a:fld>
             <a:endParaRPr lang="fr-FR"/>
@@ -2144,7 +2164,7 @@
     </p:spTree>
     <p:extLst>
       <p:ext uri="{BB962C8B-B14F-4D97-AF65-F5344CB8AC3E}">
-        <p14:creationId xmlns:p14="http://schemas.microsoft.com/office/powerpoint/2010/main" val="3767971095"/>
+        <p14:creationId xmlns:p14="http://schemas.microsoft.com/office/powerpoint/2010/main" xmlns="" val="3767971095"/>
       </p:ext>
     </p:extLst>
   </p:cSld>
@@ -2346,7 +2366,8 @@
           <a:p>
             <a:fld id="{951F5236-C321-4571-BD42-D2DAC191E61F}" type="datetimeFigureOut">
               <a:rPr lang="fr-FR" smtClean="0"/>
-              <a:t>21/11/2017</a:t>
+              <a:pPr/>
+              <a:t>15/12/2017</a:t>
             </a:fld>
             <a:endParaRPr lang="fr-FR"/>
           </a:p>
@@ -2388,6 +2409,7 @@
           <a:p>
             <a:fld id="{C31CB606-8B31-418C-870D-584FB83B743D}" type="slidenum">
               <a:rPr lang="fr-FR" smtClean="0"/>
+              <a:pPr/>
               <a:t>‹N°›</a:t>
             </a:fld>
             <a:endParaRPr lang="fr-FR"/>
@@ -2397,7 +2419,7 @@
     </p:spTree>
     <p:extLst>
       <p:ext uri="{BB962C8B-B14F-4D97-AF65-F5344CB8AC3E}">
-        <p14:creationId xmlns:p14="http://schemas.microsoft.com/office/powerpoint/2010/main" val="1787218807"/>
+        <p14:creationId xmlns:p14="http://schemas.microsoft.com/office/powerpoint/2010/main" xmlns="" val="1787218807"/>
       </p:ext>
     </p:extLst>
   </p:cSld>
@@ -2559,7 +2581,8 @@
           <a:p>
             <a:fld id="{951F5236-C321-4571-BD42-D2DAC191E61F}" type="datetimeFigureOut">
               <a:rPr lang="fr-FR" smtClean="0"/>
-              <a:t>21/11/2017</a:t>
+              <a:pPr/>
+              <a:t>15/12/2017</a:t>
             </a:fld>
             <a:endParaRPr lang="fr-FR"/>
           </a:p>
@@ -2637,6 +2660,7 @@
           <a:p>
             <a:fld id="{C31CB606-8B31-418C-870D-584FB83B743D}" type="slidenum">
               <a:rPr lang="fr-FR" smtClean="0"/>
+              <a:pPr/>
               <a:t>‹N°›</a:t>
             </a:fld>
             <a:endParaRPr lang="fr-FR"/>
@@ -2646,7 +2670,7 @@
     </p:spTree>
     <p:extLst>
       <p:ext uri="{BB962C8B-B14F-4D97-AF65-F5344CB8AC3E}">
-        <p14:creationId xmlns:p14="http://schemas.microsoft.com/office/powerpoint/2010/main" val="3108133712"/>
+        <p14:creationId xmlns:p14="http://schemas.microsoft.com/office/powerpoint/2010/main" xmlns="" val="3108133712"/>
       </p:ext>
     </p:extLst>
   </p:cSld>
@@ -2966,22 +2990,139 @@
       </p:grpSpPr>
       <p:sp>
         <p:nvSpPr>
-          <p:cNvPr id="15" name="Rectangle 14"/>
+          <p:cNvPr id="45" name="Rectangle à coins arrondis 44"/>
           <p:cNvSpPr/>
           <p:nvPr/>
         </p:nvSpPr>
         <p:spPr>
           <a:xfrm>
-            <a:off x="3241180" y="648236"/>
-            <a:ext cx="2060620" cy="5422006"/>
-          </a:xfrm>
-          <a:prstGeom prst="rect">
+            <a:off x="9290653" y="845369"/>
+            <a:ext cx="1811547" cy="3088256"/>
+          </a:xfrm>
+          <a:prstGeom prst="roundRect">
+            <a:avLst/>
+          </a:prstGeom>
+        </p:spPr>
+        <p:style>
+          <a:lnRef idx="2">
+            <a:schemeClr val="accent6">
+              <a:shade val="50000"/>
+            </a:schemeClr>
+          </a:lnRef>
+          <a:fillRef idx="1">
+            <a:schemeClr val="accent6"/>
+          </a:fillRef>
+          <a:effectRef idx="0">
+            <a:schemeClr val="accent6"/>
+          </a:effectRef>
+          <a:fontRef idx="minor">
+            <a:schemeClr val="lt1"/>
+          </a:fontRef>
+        </p:style>
+        <p:txBody>
+          <a:bodyPr rtlCol="0" anchor="ctr"/>
+          <a:lstStyle/>
+          <a:p>
+            <a:pPr algn="ctr"/>
+            <a:endParaRPr lang="fr-FR"/>
+          </a:p>
+        </p:txBody>
+      </p:sp>
+      <p:sp>
+        <p:nvSpPr>
+          <p:cNvPr id="44" name="Rectangle à coins arrondis 43"/>
+          <p:cNvSpPr/>
+          <p:nvPr/>
+        </p:nvSpPr>
+        <p:spPr>
+          <a:xfrm>
+            <a:off x="3292416" y="618226"/>
+            <a:ext cx="2001328" cy="5443268"/>
+          </a:xfrm>
+          <a:prstGeom prst="roundRect">
+            <a:avLst/>
+          </a:prstGeom>
+        </p:spPr>
+        <p:style>
+          <a:lnRef idx="1">
+            <a:schemeClr val="accent2"/>
+          </a:lnRef>
+          <a:fillRef idx="2">
+            <a:schemeClr val="accent2"/>
+          </a:fillRef>
+          <a:effectRef idx="1">
+            <a:schemeClr val="accent2"/>
+          </a:effectRef>
+          <a:fontRef idx="minor">
+            <a:schemeClr val="dk1"/>
+          </a:fontRef>
+        </p:style>
+        <p:txBody>
+          <a:bodyPr rtlCol="0" anchor="ctr"/>
+          <a:lstStyle/>
+          <a:p>
+            <a:pPr algn="ctr"/>
+            <a:endParaRPr lang="fr-FR"/>
+          </a:p>
+        </p:txBody>
+      </p:sp>
+      <p:sp>
+        <p:nvSpPr>
+          <p:cNvPr id="43" name="Rectangle à coins arrondis 42"/>
+          <p:cNvSpPr/>
+          <p:nvPr/>
+        </p:nvSpPr>
+        <p:spPr>
+          <a:xfrm>
+            <a:off x="293299" y="603849"/>
+            <a:ext cx="2001328" cy="5443268"/>
+          </a:xfrm>
+          <a:prstGeom prst="roundRect">
+            <a:avLst/>
+          </a:prstGeom>
+        </p:spPr>
+        <p:style>
+          <a:lnRef idx="2">
+            <a:schemeClr val="accent2">
+              <a:shade val="50000"/>
+            </a:schemeClr>
+          </a:lnRef>
+          <a:fillRef idx="1">
+            <a:schemeClr val="accent2"/>
+          </a:fillRef>
+          <a:effectRef idx="0">
+            <a:schemeClr val="accent2"/>
+          </a:effectRef>
+          <a:fontRef idx="minor">
+            <a:schemeClr val="lt1"/>
+          </a:fontRef>
+        </p:style>
+        <p:txBody>
+          <a:bodyPr rtlCol="0" anchor="ctr"/>
+          <a:lstStyle/>
+          <a:p>
+            <a:pPr algn="ctr"/>
+            <a:endParaRPr lang="fr-FR"/>
+          </a:p>
+        </p:txBody>
+      </p:sp>
+      <p:sp>
+        <p:nvSpPr>
+          <p:cNvPr id="4" name="Organigramme : Disque magnétique 3"/>
+          <p:cNvSpPr/>
+          <p:nvPr/>
+        </p:nvSpPr>
+        <p:spPr>
+          <a:xfrm>
+            <a:off x="918690" y="1725768"/>
+            <a:ext cx="708338" cy="927279"/>
+          </a:xfrm>
+          <a:prstGeom prst="flowChartMagneticDisk">
             <a:avLst/>
           </a:prstGeom>
           <a:solidFill>
-            <a:schemeClr val="accent4">
-              <a:lumMod val="60000"/>
-              <a:lumOff val="40000"/>
+            <a:schemeClr val="bg1">
+              <a:lumMod val="75000"/>
             </a:schemeClr>
           </a:solidFill>
         </p:spPr>
@@ -3012,22 +3153,55 @@
       </p:sp>
       <p:sp>
         <p:nvSpPr>
-          <p:cNvPr id="13" name="Rectangle 12"/>
-          <p:cNvSpPr/>
+          <p:cNvPr id="8" name="ZoneTexte 7"/>
+          <p:cNvSpPr txBox="1"/>
           <p:nvPr/>
         </p:nvSpPr>
         <p:spPr>
           <a:xfrm>
-            <a:off x="242549" y="648236"/>
-            <a:ext cx="2060620" cy="5422006"/>
+            <a:off x="557985" y="2189407"/>
+            <a:ext cx="1403205" cy="369332"/>
           </a:xfrm>
           <a:prstGeom prst="rect">
             <a:avLst/>
           </a:prstGeom>
+          <a:noFill/>
+        </p:spPr>
+        <p:txBody>
+          <a:bodyPr wrap="none" rtlCol="0">
+            <a:spAutoFit/>
+          </a:bodyPr>
+          <a:lstStyle/>
+          <a:p>
+            <a:r>
+              <a:rPr lang="fr-FR" dirty="0" smtClean="0"/>
+              <a:t>CSV </a:t>
+            </a:r>
+            <a:r>
+              <a:rPr lang="fr-FR" dirty="0" err="1" smtClean="0"/>
+              <a:t>Datasets</a:t>
+            </a:r>
+            <a:endParaRPr lang="fr-FR" dirty="0" smtClean="0"/>
+          </a:p>
+        </p:txBody>
+      </p:sp>
+      <p:sp>
+        <p:nvSpPr>
+          <p:cNvPr id="9" name="Organigramme : Disque magnétique 8"/>
+          <p:cNvSpPr/>
+          <p:nvPr/>
+        </p:nvSpPr>
+        <p:spPr>
+          <a:xfrm>
+            <a:off x="918690" y="2895600"/>
+            <a:ext cx="708338" cy="927279"/>
+          </a:xfrm>
+          <a:prstGeom prst="flowChartMagneticDisk">
+            <a:avLst/>
+          </a:prstGeom>
           <a:solidFill>
-            <a:schemeClr val="accent2">
-              <a:lumMod val="60000"/>
-              <a:lumOff val="40000"/>
+            <a:schemeClr val="bg1">
+              <a:lumMod val="75000"/>
             </a:schemeClr>
           </a:solidFill>
         </p:spPr>
@@ -3058,13 +3232,46 @@
       </p:sp>
       <p:sp>
         <p:nvSpPr>
-          <p:cNvPr id="4" name="Organigramme : Disque magnétique 3"/>
+          <p:cNvPr id="10" name="ZoneTexte 9"/>
+          <p:cNvSpPr txBox="1"/>
+          <p:nvPr/>
+        </p:nvSpPr>
+        <p:spPr>
+          <a:xfrm>
+            <a:off x="518039" y="3346358"/>
+            <a:ext cx="1483098" cy="369332"/>
+          </a:xfrm>
+          <a:prstGeom prst="rect">
+            <a:avLst/>
+          </a:prstGeom>
+          <a:noFill/>
+        </p:spPr>
+        <p:txBody>
+          <a:bodyPr wrap="none" rtlCol="0">
+            <a:spAutoFit/>
+          </a:bodyPr>
+          <a:lstStyle/>
+          <a:p>
+            <a:r>
+              <a:rPr lang="fr-FR" dirty="0" err="1" smtClean="0"/>
+              <a:t>GeoJSON</a:t>
+            </a:r>
+            <a:r>
+              <a:rPr lang="fr-FR" dirty="0" smtClean="0"/>
+              <a:t> files</a:t>
+            </a:r>
+          </a:p>
+        </p:txBody>
+      </p:sp>
+      <p:sp>
+        <p:nvSpPr>
+          <p:cNvPr id="11" name="Organigramme : Disque magnétique 10"/>
           <p:cNvSpPr/>
           <p:nvPr/>
         </p:nvSpPr>
         <p:spPr>
           <a:xfrm>
-            <a:off x="918690" y="1725768"/>
+            <a:off x="905419" y="4065432"/>
             <a:ext cx="708338" cy="927279"/>
           </a:xfrm>
           <a:prstGeom prst="flowChartMagneticDisk">
@@ -3103,14 +3310,14 @@
       </p:sp>
       <p:sp>
         <p:nvSpPr>
-          <p:cNvPr id="8" name="ZoneTexte 7"/>
+          <p:cNvPr id="12" name="ZoneTexte 11"/>
           <p:cNvSpPr txBox="1"/>
           <p:nvPr/>
         </p:nvSpPr>
         <p:spPr>
           <a:xfrm>
-            <a:off x="557985" y="2189407"/>
-            <a:ext cx="1403205" cy="369332"/>
+            <a:off x="490049" y="4516190"/>
+            <a:ext cx="1539076" cy="369332"/>
           </a:xfrm>
           <a:prstGeom prst="rect">
             <a:avLst/>
@@ -3129,7 +3336,7 @@
             </a:r>
             <a:r>
               <a:rPr lang="fr-FR" dirty="0" err="1" smtClean="0"/>
-              <a:t>Datasets</a:t>
+              <a:t>pollutants</a:t>
             </a:r>
             <a:endParaRPr lang="fr-FR" dirty="0" smtClean="0"/>
           </a:p>
@@ -3137,23 +3344,138 @@
       </p:sp>
       <p:sp>
         <p:nvSpPr>
-          <p:cNvPr id="9" name="Organigramme : Disque magnétique 8"/>
+          <p:cNvPr id="14" name="ZoneTexte 13"/>
+          <p:cNvSpPr txBox="1"/>
+          <p:nvPr/>
+        </p:nvSpPr>
+        <p:spPr>
+          <a:xfrm>
+            <a:off x="571545" y="925268"/>
+            <a:ext cx="1402628" cy="369332"/>
+          </a:xfrm>
+          <a:prstGeom prst="rect">
+            <a:avLst/>
+          </a:prstGeom>
+          <a:noFill/>
+        </p:spPr>
+        <p:txBody>
+          <a:bodyPr wrap="none" rtlCol="0">
+            <a:spAutoFit/>
+          </a:bodyPr>
+          <a:lstStyle/>
+          <a:p>
+            <a:r>
+              <a:rPr lang="fr-FR" dirty="0" smtClean="0"/>
+              <a:t>Data Sources</a:t>
+            </a:r>
+            <a:endParaRPr lang="fr-FR" dirty="0"/>
+          </a:p>
+        </p:txBody>
+      </p:sp>
+      <p:sp>
+        <p:nvSpPr>
+          <p:cNvPr id="16" name="ZoneTexte 15"/>
+          <p:cNvSpPr txBox="1"/>
+          <p:nvPr/>
+        </p:nvSpPr>
+        <p:spPr>
+          <a:xfrm>
+            <a:off x="4018055" y="925268"/>
+            <a:ext cx="506870" cy="369332"/>
+          </a:xfrm>
+          <a:prstGeom prst="rect">
+            <a:avLst/>
+          </a:prstGeom>
+          <a:noFill/>
+        </p:spPr>
+        <p:txBody>
+          <a:bodyPr wrap="none" rtlCol="0">
+            <a:spAutoFit/>
+          </a:bodyPr>
+          <a:lstStyle/>
+          <a:p>
+            <a:r>
+              <a:rPr lang="fr-FR" dirty="0" smtClean="0"/>
+              <a:t>ETL</a:t>
+            </a:r>
+            <a:endParaRPr lang="fr-FR" dirty="0"/>
+          </a:p>
+        </p:txBody>
+      </p:sp>
+      <p:pic>
+        <p:nvPicPr>
+          <p:cNvPr id="19" name="Image 18"/>
+          <p:cNvPicPr>
+            <a:picLocks noChangeAspect="1"/>
+          </p:cNvPicPr>
+          <p:nvPr/>
+        </p:nvPicPr>
+        <p:blipFill>
+          <a:blip r:embed="rId2" cstate="print">
+            <a:extLst>
+              <a:ext uri="{28A0092B-C50C-407E-A947-70E740481C1C}">
+                <a14:useLocalDpi xmlns:a14="http://schemas.microsoft.com/office/drawing/2010/main" xmlns="" val="0"/>
+              </a:ext>
+            </a:extLst>
+          </a:blip>
+          <a:stretch>
+            <a:fillRect/>
+          </a:stretch>
+        </p:blipFill>
+        <p:spPr>
+          <a:xfrm>
+            <a:off x="3611305" y="2073553"/>
+            <a:ext cx="1294600" cy="1294600"/>
+          </a:xfrm>
+          <a:prstGeom prst="rect">
+            <a:avLst/>
+          </a:prstGeom>
+        </p:spPr>
+      </p:pic>
+      <p:pic>
+        <p:nvPicPr>
+          <p:cNvPr id="21" name="Image 20"/>
+          <p:cNvPicPr>
+            <a:picLocks noChangeAspect="1"/>
+          </p:cNvPicPr>
+          <p:nvPr/>
+        </p:nvPicPr>
+        <p:blipFill>
+          <a:blip r:embed="rId3">
+            <a:extLst>
+              <a:ext uri="{28A0092B-C50C-407E-A947-70E740481C1C}">
+                <a14:useLocalDpi xmlns:a14="http://schemas.microsoft.com/office/drawing/2010/main" xmlns="" val="0"/>
+              </a:ext>
+            </a:extLst>
+          </a:blip>
+          <a:stretch>
+            <a:fillRect/>
+          </a:stretch>
+        </p:blipFill>
+        <p:spPr>
+          <a:xfrm>
+            <a:off x="3217562" y="3368153"/>
+            <a:ext cx="2082087" cy="742490"/>
+          </a:xfrm>
+          <a:prstGeom prst="rect">
+            <a:avLst/>
+          </a:prstGeom>
+        </p:spPr>
+      </p:pic>
+      <p:sp>
+        <p:nvSpPr>
+          <p:cNvPr id="22" name="Organigramme : Disque magnétique 21"/>
           <p:cNvSpPr/>
           <p:nvPr/>
         </p:nvSpPr>
         <p:spPr>
           <a:xfrm>
-            <a:off x="918690" y="2895600"/>
-            <a:ext cx="708338" cy="927279"/>
+            <a:off x="6266296" y="1294600"/>
+            <a:ext cx="1859778" cy="3113498"/>
           </a:xfrm>
           <a:prstGeom prst="flowChartMagneticDisk">
             <a:avLst/>
           </a:prstGeom>
-          <a:solidFill>
-            <a:schemeClr val="bg1">
-              <a:lumMod val="75000"/>
-            </a:schemeClr>
-          </a:solidFill>
         </p:spPr>
         <p:style>
           <a:lnRef idx="2">
@@ -3176,20 +3498,20 @@
           <a:lstStyle/>
           <a:p>
             <a:pPr algn="ctr"/>
-            <a:endParaRPr lang="fr-FR" dirty="0"/>
-          </a:p>
-        </p:txBody>
-      </p:sp>
-      <p:sp>
-        <p:nvSpPr>
-          <p:cNvPr id="10" name="ZoneTexte 9"/>
+            <a:endParaRPr lang="fr-FR"/>
+          </a:p>
+        </p:txBody>
+      </p:sp>
+      <p:sp>
+        <p:nvSpPr>
+          <p:cNvPr id="23" name="ZoneTexte 22"/>
           <p:cNvSpPr txBox="1"/>
           <p:nvPr/>
         </p:nvSpPr>
         <p:spPr>
           <a:xfrm>
-            <a:off x="518039" y="3346358"/>
-            <a:ext cx="1483098" cy="369332"/>
+            <a:off x="6291547" y="3659515"/>
+            <a:ext cx="1744452" cy="369332"/>
           </a:xfrm>
           <a:prstGeom prst="rect">
             <a:avLst/>
@@ -3203,150 +3525,12 @@
           <a:lstStyle/>
           <a:p>
             <a:r>
+              <a:rPr lang="fr-FR" dirty="0" smtClean="0"/>
+              <a:t>Data </a:t>
+            </a:r>
+            <a:r>
               <a:rPr lang="fr-FR" dirty="0" err="1" smtClean="0"/>
-              <a:t>GeoJSON</a:t>
-            </a:r>
-            <a:r>
-              <a:rPr lang="fr-FR" dirty="0" smtClean="0"/>
-              <a:t> files</a:t>
-            </a:r>
-          </a:p>
-        </p:txBody>
-      </p:sp>
-      <p:sp>
-        <p:nvSpPr>
-          <p:cNvPr id="11" name="Organigramme : Disque magnétique 10"/>
-          <p:cNvSpPr/>
-          <p:nvPr/>
-        </p:nvSpPr>
-        <p:spPr>
-          <a:xfrm>
-            <a:off x="905419" y="4065432"/>
-            <a:ext cx="708338" cy="927279"/>
-          </a:xfrm>
-          <a:prstGeom prst="flowChartMagneticDisk">
-            <a:avLst/>
-          </a:prstGeom>
-          <a:solidFill>
-            <a:schemeClr val="bg1">
-              <a:lumMod val="75000"/>
-            </a:schemeClr>
-          </a:solidFill>
-        </p:spPr>
-        <p:style>
-          <a:lnRef idx="2">
-            <a:schemeClr val="accent1">
-              <a:shade val="50000"/>
-            </a:schemeClr>
-          </a:lnRef>
-          <a:fillRef idx="1">
-            <a:schemeClr val="accent1"/>
-          </a:fillRef>
-          <a:effectRef idx="0">
-            <a:schemeClr val="accent1"/>
-          </a:effectRef>
-          <a:fontRef idx="minor">
-            <a:schemeClr val="lt1"/>
-          </a:fontRef>
-        </p:style>
-        <p:txBody>
-          <a:bodyPr rtlCol="0" anchor="ctr"/>
-          <a:lstStyle/>
-          <a:p>
-            <a:pPr algn="ctr"/>
-            <a:endParaRPr lang="fr-FR" dirty="0"/>
-          </a:p>
-        </p:txBody>
-      </p:sp>
-      <p:sp>
-        <p:nvSpPr>
-          <p:cNvPr id="12" name="ZoneTexte 11"/>
-          <p:cNvSpPr txBox="1"/>
-          <p:nvPr/>
-        </p:nvSpPr>
-        <p:spPr>
-          <a:xfrm>
-            <a:off x="490049" y="4516190"/>
-            <a:ext cx="1539076" cy="369332"/>
-          </a:xfrm>
-          <a:prstGeom prst="rect">
-            <a:avLst/>
-          </a:prstGeom>
-          <a:noFill/>
-        </p:spPr>
-        <p:txBody>
-          <a:bodyPr wrap="none" rtlCol="0">
-            <a:spAutoFit/>
-          </a:bodyPr>
-          <a:lstStyle/>
-          <a:p>
-            <a:r>
-              <a:rPr lang="fr-FR" dirty="0" smtClean="0"/>
-              <a:t>CSV </a:t>
-            </a:r>
-            <a:r>
-              <a:rPr lang="fr-FR" dirty="0" err="1" smtClean="0"/>
-              <a:t>pollutants</a:t>
-            </a:r>
-            <a:endParaRPr lang="fr-FR" dirty="0" smtClean="0"/>
-          </a:p>
-        </p:txBody>
-      </p:sp>
-      <p:sp>
-        <p:nvSpPr>
-          <p:cNvPr id="14" name="ZoneTexte 13"/>
-          <p:cNvSpPr txBox="1"/>
-          <p:nvPr/>
-        </p:nvSpPr>
-        <p:spPr>
-          <a:xfrm>
-            <a:off x="571545" y="925268"/>
-            <a:ext cx="1402628" cy="369332"/>
-          </a:xfrm>
-          <a:prstGeom prst="rect">
-            <a:avLst/>
-          </a:prstGeom>
-          <a:noFill/>
-        </p:spPr>
-        <p:txBody>
-          <a:bodyPr wrap="none" rtlCol="0">
-            <a:spAutoFit/>
-          </a:bodyPr>
-          <a:lstStyle/>
-          <a:p>
-            <a:r>
-              <a:rPr lang="fr-FR" dirty="0" smtClean="0"/>
-              <a:t>Data Sources</a:t>
-            </a:r>
-            <a:endParaRPr lang="fr-FR" dirty="0"/>
-          </a:p>
-        </p:txBody>
-      </p:sp>
-      <p:sp>
-        <p:nvSpPr>
-          <p:cNvPr id="16" name="ZoneTexte 15"/>
-          <p:cNvSpPr txBox="1"/>
-          <p:nvPr/>
-        </p:nvSpPr>
-        <p:spPr>
-          <a:xfrm>
-            <a:off x="4018055" y="925268"/>
-            <a:ext cx="506870" cy="369332"/>
-          </a:xfrm>
-          <a:prstGeom prst="rect">
-            <a:avLst/>
-          </a:prstGeom>
-          <a:noFill/>
-        </p:spPr>
-        <p:txBody>
-          <a:bodyPr wrap="none" rtlCol="0">
-            <a:spAutoFit/>
-          </a:bodyPr>
-          <a:lstStyle/>
-          <a:p>
-            <a:r>
-              <a:rPr lang="fr-FR" dirty="0" smtClean="0"/>
-              <a:t>ETL</a:t>
+              <a:t>Warehouse</a:t>
             </a:r>
             <a:endParaRPr lang="fr-FR" dirty="0"/>
           </a:p>
@@ -3354,28 +3538,22 @@
       </p:sp>
       <p:pic>
         <p:nvPicPr>
-          <p:cNvPr id="19" name="Image 18"/>
+          <p:cNvPr id="17" name="Image 16" descr="Apache_Hive_logo.svg.png"/>
           <p:cNvPicPr>
             <a:picLocks noChangeAspect="1"/>
           </p:cNvPicPr>
           <p:nvPr/>
         </p:nvPicPr>
         <p:blipFill>
-          <a:blip r:embed="rId2" cstate="print">
-            <a:extLst>
-              <a:ext uri="{28A0092B-C50C-407E-A947-70E740481C1C}">
-                <a14:useLocalDpi xmlns:a14="http://schemas.microsoft.com/office/drawing/2010/main" val="0"/>
-              </a:ext>
-            </a:extLst>
-          </a:blip>
+          <a:blip r:embed="rId4" cstate="print"/>
           <a:stretch>
             <a:fillRect/>
           </a:stretch>
         </p:blipFill>
         <p:spPr>
           <a:xfrm>
-            <a:off x="3611305" y="2073553"/>
-            <a:ext cx="1294600" cy="1294600"/>
+            <a:off x="6650965" y="2468879"/>
+            <a:ext cx="1043797" cy="939418"/>
           </a:xfrm>
           <a:prstGeom prst="rect">
             <a:avLst/>
@@ -3384,28 +3562,22 @@
       </p:pic>
       <p:pic>
         <p:nvPicPr>
-          <p:cNvPr id="21" name="Image 20"/>
+          <p:cNvPr id="27" name="Image 26" descr="stocks-graphic-with-a-magnifier-tool_icon-icons.com_70602.png"/>
           <p:cNvPicPr>
             <a:picLocks noChangeAspect="1"/>
           </p:cNvPicPr>
           <p:nvPr/>
         </p:nvPicPr>
         <p:blipFill>
-          <a:blip r:embed="rId3">
-            <a:extLst>
-              <a:ext uri="{28A0092B-C50C-407E-A947-70E740481C1C}">
-                <a14:useLocalDpi xmlns:a14="http://schemas.microsoft.com/office/drawing/2010/main" val="0"/>
-              </a:ext>
-            </a:extLst>
-          </a:blip>
+          <a:blip r:embed="rId5" cstate="print"/>
           <a:stretch>
             <a:fillRect/>
           </a:stretch>
         </p:blipFill>
         <p:spPr>
           <a:xfrm>
-            <a:off x="3217562" y="3368153"/>
-            <a:ext cx="2082087" cy="742490"/>
+            <a:off x="9746367" y="2308936"/>
+            <a:ext cx="1012214" cy="1012214"/>
           </a:xfrm>
           <a:prstGeom prst="rect">
             <a:avLst/>
@@ -3414,30 +3586,66 @@
       </p:pic>
       <p:sp>
         <p:nvSpPr>
-          <p:cNvPr id="22" name="Organigramme : Disque magnétique 21"/>
+          <p:cNvPr id="28" name="ZoneTexte 27"/>
+          <p:cNvSpPr txBox="1"/>
+          <p:nvPr/>
+        </p:nvSpPr>
+        <p:spPr>
+          <a:xfrm>
+            <a:off x="9497012" y="1094901"/>
+            <a:ext cx="1460143" cy="646331"/>
+          </a:xfrm>
+          <a:prstGeom prst="rect">
+            <a:avLst/>
+          </a:prstGeom>
+          <a:noFill/>
+        </p:spPr>
+        <p:txBody>
+          <a:bodyPr wrap="none" rtlCol="0">
+            <a:spAutoFit/>
+          </a:bodyPr>
+          <a:lstStyle/>
+          <a:p>
+            <a:r>
+              <a:rPr lang="fr-FR" dirty="0" smtClean="0"/>
+              <a:t>Analyses and </a:t>
+            </a:r>
+          </a:p>
+          <a:p>
+            <a:r>
+              <a:rPr lang="fr-FR" dirty="0" smtClean="0"/>
+              <a:t>Reporting </a:t>
+            </a:r>
+            <a:endParaRPr lang="fr-FR" dirty="0"/>
+          </a:p>
+        </p:txBody>
+      </p:sp>
+      <p:sp>
+        <p:nvSpPr>
+          <p:cNvPr id="37" name="Flèche droite 36"/>
           <p:cNvSpPr/>
           <p:nvPr/>
         </p:nvSpPr>
         <p:spPr>
           <a:xfrm>
-            <a:off x="6076524" y="1294600"/>
-            <a:ext cx="2421228" cy="3541690"/>
-          </a:xfrm>
-          <a:prstGeom prst="flowChartMagneticDisk">
+            <a:off x="2380893" y="3174521"/>
+            <a:ext cx="802257" cy="327814"/>
+          </a:xfrm>
+          <a:prstGeom prst="rightArrow">
             <a:avLst/>
           </a:prstGeom>
         </p:spPr>
         <p:style>
           <a:lnRef idx="2">
-            <a:schemeClr val="accent1">
+            <a:schemeClr val="dk1">
               <a:shade val="50000"/>
             </a:schemeClr>
           </a:lnRef>
           <a:fillRef idx="1">
-            <a:schemeClr val="accent1"/>
+            <a:schemeClr val="dk1"/>
           </a:fillRef>
           <a:effectRef idx="0">
-            <a:schemeClr val="accent1"/>
+            <a:schemeClr val="dk1"/>
           </a:effectRef>
           <a:fontRef idx="minor">
             <a:schemeClr val="lt1"/>
@@ -3454,14 +3662,116 @@
       </p:sp>
       <p:sp>
         <p:nvSpPr>
-          <p:cNvPr id="23" name="ZoneTexte 22"/>
+          <p:cNvPr id="39" name="Flèche droite 38"/>
+          <p:cNvSpPr/>
+          <p:nvPr/>
+        </p:nvSpPr>
+        <p:spPr>
+          <a:xfrm>
+            <a:off x="5388631" y="3180273"/>
+            <a:ext cx="802257" cy="327814"/>
+          </a:xfrm>
+          <a:prstGeom prst="rightArrow">
+            <a:avLst/>
+          </a:prstGeom>
+        </p:spPr>
+        <p:style>
+          <a:lnRef idx="2">
+            <a:schemeClr val="dk1">
+              <a:shade val="50000"/>
+            </a:schemeClr>
+          </a:lnRef>
+          <a:fillRef idx="1">
+            <a:schemeClr val="dk1"/>
+          </a:fillRef>
+          <a:effectRef idx="0">
+            <a:schemeClr val="dk1"/>
+          </a:effectRef>
+          <a:fontRef idx="minor">
+            <a:schemeClr val="lt1"/>
+          </a:fontRef>
+        </p:style>
+        <p:txBody>
+          <a:bodyPr rtlCol="0" anchor="ctr"/>
+          <a:lstStyle/>
+          <a:p>
+            <a:pPr algn="ctr"/>
+            <a:endParaRPr lang="fr-FR"/>
+          </a:p>
+        </p:txBody>
+      </p:sp>
+      <p:sp>
+        <p:nvSpPr>
+          <p:cNvPr id="40" name="Rectangle à coins arrondis 39"/>
+          <p:cNvSpPr/>
+          <p:nvPr/>
+        </p:nvSpPr>
+        <p:spPr>
+          <a:xfrm>
+            <a:off x="8177842" y="4865298"/>
+            <a:ext cx="2665562" cy="1639019"/>
+          </a:xfrm>
+          <a:prstGeom prst="roundRect">
+            <a:avLst/>
+          </a:prstGeom>
+        </p:spPr>
+        <p:style>
+          <a:lnRef idx="0">
+            <a:schemeClr val="accent4"/>
+          </a:lnRef>
+          <a:fillRef idx="3">
+            <a:schemeClr val="accent4"/>
+          </a:fillRef>
+          <a:effectRef idx="3">
+            <a:schemeClr val="accent4"/>
+          </a:effectRef>
+          <a:fontRef idx="minor">
+            <a:schemeClr val="lt1"/>
+          </a:fontRef>
+        </p:style>
+        <p:txBody>
+          <a:bodyPr rtlCol="0" anchor="ctr"/>
+          <a:lstStyle/>
+          <a:p>
+            <a:pPr algn="ctr"/>
+            <a:endParaRPr lang="fr-FR"/>
+          </a:p>
+        </p:txBody>
+      </p:sp>
+      <p:pic>
+        <p:nvPicPr>
+          <p:cNvPr id="41" name="Image 40" descr="olap cube.png"/>
+          <p:cNvPicPr>
+            <a:picLocks noChangeAspect="1"/>
+          </p:cNvPicPr>
+          <p:nvPr/>
+        </p:nvPicPr>
+        <p:blipFill>
+          <a:blip r:embed="rId6" cstate="print"/>
+          <a:stretch>
+            <a:fillRect/>
+          </a:stretch>
+        </p:blipFill>
+        <p:spPr>
+          <a:xfrm>
+            <a:off x="9778374" y="5506862"/>
+            <a:ext cx="876685" cy="876685"/>
+          </a:xfrm>
+          <a:prstGeom prst="rect">
+            <a:avLst/>
+          </a:prstGeom>
+        </p:spPr>
+      </p:pic>
+      <p:sp>
+        <p:nvSpPr>
+          <p:cNvPr id="42" name="ZoneTexte 41"/>
           <p:cNvSpPr txBox="1"/>
           <p:nvPr/>
         </p:nvSpPr>
         <p:spPr>
           <a:xfrm>
-            <a:off x="6403691" y="4125342"/>
-            <a:ext cx="1766894" cy="369332"/>
+            <a:off x="8876597" y="4941976"/>
+            <a:ext cx="1221809" cy="369332"/>
           </a:xfrm>
           <a:prstGeom prst="rect">
             <a:avLst/>
@@ -3476,20 +3786,120 @@
           <a:p>
             <a:r>
               <a:rPr lang="fr-FR" dirty="0" smtClean="0"/>
-              <a:t>Data </a:t>
-            </a:r>
-            <a:r>
-              <a:rPr lang="fr-FR" dirty="0" err="1" smtClean="0"/>
-              <a:t>WareHouse</a:t>
+              <a:t>OLAP Cube</a:t>
             </a:r>
             <a:endParaRPr lang="fr-FR" dirty="0"/>
           </a:p>
         </p:txBody>
       </p:sp>
+      <p:sp>
+        <p:nvSpPr>
+          <p:cNvPr id="46" name="Flèche droite 45"/>
+          <p:cNvSpPr/>
+          <p:nvPr/>
+        </p:nvSpPr>
+        <p:spPr>
+          <a:xfrm>
+            <a:off x="8310111" y="2332008"/>
+            <a:ext cx="802257" cy="327814"/>
+          </a:xfrm>
+          <a:prstGeom prst="rightArrow">
+            <a:avLst/>
+          </a:prstGeom>
+        </p:spPr>
+        <p:style>
+          <a:lnRef idx="2">
+            <a:schemeClr val="dk1">
+              <a:shade val="50000"/>
+            </a:schemeClr>
+          </a:lnRef>
+          <a:fillRef idx="1">
+            <a:schemeClr val="dk1"/>
+          </a:fillRef>
+          <a:effectRef idx="0">
+            <a:schemeClr val="dk1"/>
+          </a:effectRef>
+          <a:fontRef idx="minor">
+            <a:schemeClr val="lt1"/>
+          </a:fontRef>
+        </p:style>
+        <p:txBody>
+          <a:bodyPr rtlCol="0" anchor="ctr"/>
+          <a:lstStyle/>
+          <a:p>
+            <a:pPr algn="ctr"/>
+            <a:endParaRPr lang="fr-FR"/>
+          </a:p>
+        </p:txBody>
+      </p:sp>
+      <p:sp>
+        <p:nvSpPr>
+          <p:cNvPr id="47" name="Flèche droite 46"/>
+          <p:cNvSpPr/>
+          <p:nvPr/>
+        </p:nvSpPr>
+        <p:spPr>
+          <a:xfrm rot="2978075">
+            <a:off x="8016814" y="4264327"/>
+            <a:ext cx="802257" cy="327814"/>
+          </a:xfrm>
+          <a:prstGeom prst="rightArrow">
+            <a:avLst/>
+          </a:prstGeom>
+        </p:spPr>
+        <p:style>
+          <a:lnRef idx="2">
+            <a:schemeClr val="dk1">
+              <a:shade val="50000"/>
+            </a:schemeClr>
+          </a:lnRef>
+          <a:fillRef idx="1">
+            <a:schemeClr val="dk1"/>
+          </a:fillRef>
+          <a:effectRef idx="0">
+            <a:schemeClr val="dk1"/>
+          </a:effectRef>
+          <a:fontRef idx="minor">
+            <a:schemeClr val="lt1"/>
+          </a:fontRef>
+        </p:style>
+        <p:txBody>
+          <a:bodyPr rtlCol="0" anchor="ctr"/>
+          <a:lstStyle/>
+          <a:p>
+            <a:pPr algn="ctr"/>
+            <a:endParaRPr lang="fr-FR"/>
+          </a:p>
+        </p:txBody>
+      </p:sp>
+      <p:pic>
+        <p:nvPicPr>
+          <p:cNvPr id="48" name="Image 47" descr="Apache_Hive_logo.svg.png"/>
+          <p:cNvPicPr>
+            <a:picLocks noChangeAspect="1"/>
+          </p:cNvPicPr>
+          <p:nvPr/>
+        </p:nvPicPr>
+        <p:blipFill>
+          <a:blip r:embed="rId7" cstate="print"/>
+          <a:stretch>
+            <a:fillRect/>
+          </a:stretch>
+        </p:blipFill>
+        <p:spPr>
+          <a:xfrm>
+            <a:off x="8494143" y="5606018"/>
+            <a:ext cx="729732" cy="656759"/>
+          </a:xfrm>
+          <a:prstGeom prst="rect">
+            <a:avLst/>
+          </a:prstGeom>
+        </p:spPr>
+      </p:pic>
     </p:spTree>
     <p:extLst>
       <p:ext uri="{BB962C8B-B14F-4D97-AF65-F5344CB8AC3E}">
-        <p14:creationId xmlns:p14="http://schemas.microsoft.com/office/powerpoint/2010/main" val="2292035041"/>
+        <p14:creationId xmlns:p14="http://schemas.microsoft.com/office/powerpoint/2010/main" xmlns="" val="2292035041"/>
       </p:ext>
     </p:extLst>
   </p:cSld>
@@ -3542,7 +3952,7 @@
     </a:clrScheme>
     <a:fontScheme name="Office">
       <a:majorFont>
-        <a:latin typeface="Calibri Light" panose="020F0302020204030204"/>
+        <a:latin typeface="Calibri Light"/>
         <a:ea typeface=""/>
         <a:cs typeface=""/>
         <a:font script="Jpan" typeface="ＭＳ Ｐゴシック"/>
@@ -3577,7 +3987,7 @@
         <a:font script="Geor" typeface="Sylfaen"/>
       </a:majorFont>
       <a:minorFont>
-        <a:latin typeface="Calibri" panose="020F0502020204030204"/>
+        <a:latin typeface="Calibri"/>
         <a:ea typeface=""/>
         <a:cs typeface=""/>
         <a:font script="Jpan" typeface="ＭＳ Ｐゴシック"/>
@@ -3754,7 +4164,7 @@
   <a:extraClrSchemeLst/>
   <a:extLst>
     <a:ext uri="{05A4C25C-085E-4340-85A3-A5531E510DB2}">
-      <thm15:themeFamily xmlns:thm15="http://schemas.microsoft.com/office/thememl/2012/main" name="Office Theme" id="{62F939B6-93AF-4DB8-9C6B-D6C7DFDC589F}" vid="{4A3C46E8-61CC-4603-A589-7422A47A8E4A}"/>
+      <thm15:themeFamily xmlns:thm15="http://schemas.microsoft.com/office/thememl/2012/main" xmlns="" name="Office Theme" id="{62F939B6-93AF-4DB8-9C6B-D6C7DFDC589F}" vid="{4A3C46E8-61CC-4603-A589-7422A47A8E4A}"/>
     </a:ext>
   </a:extLst>
 </a:theme>

</xml_diff>